<commit_message>
adde git intro ppt and editted git.ppt
</commit_message>
<xml_diff>
--- a/GIT/GIT-Version Control System.pptx
+++ b/GIT/GIT-Version Control System.pptx
@@ -208,7 +208,7 @@
           <a:p>
             <a:fld id="{58EBEF84-E0B7-4657-B659-9AB3748AF2E1}" type="datetimeFigureOut">
               <a:rPr lang="en-US" smtClean="0"/>
-              <a:t>5/30/2017</a:t>
+              <a:t>7/23/2017</a:t>
             </a:fld>
             <a:endParaRPr lang="en-IN"/>
           </a:p>
@@ -1470,7 +1470,7 @@
           <a:p>
             <a:fld id="{3A8F5538-2B5C-47D5-AABA-39B0C9F2042E}" type="datetimeFigureOut">
               <a:rPr lang="en-US" smtClean="0"/>
-              <a:t>5/30/2017</a:t>
+              <a:t>7/23/2017</a:t>
             </a:fld>
             <a:endParaRPr lang="en-IN"/>
           </a:p>
@@ -1635,7 +1635,7 @@
           <a:p>
             <a:fld id="{3A8F5538-2B5C-47D5-AABA-39B0C9F2042E}" type="datetimeFigureOut">
               <a:rPr lang="en-US" smtClean="0"/>
-              <a:t>5/30/2017</a:t>
+              <a:t>7/23/2017</a:t>
             </a:fld>
             <a:endParaRPr lang="en-IN"/>
           </a:p>
@@ -1810,7 +1810,7 @@
           <a:p>
             <a:fld id="{3A8F5538-2B5C-47D5-AABA-39B0C9F2042E}" type="datetimeFigureOut">
               <a:rPr lang="en-US" smtClean="0"/>
-              <a:t>5/30/2017</a:t>
+              <a:t>7/23/2017</a:t>
             </a:fld>
             <a:endParaRPr lang="en-IN"/>
           </a:p>
@@ -1975,7 +1975,7 @@
           <a:p>
             <a:fld id="{3A8F5538-2B5C-47D5-AABA-39B0C9F2042E}" type="datetimeFigureOut">
               <a:rPr lang="en-US" smtClean="0"/>
-              <a:t>5/30/2017</a:t>
+              <a:t>7/23/2017</a:t>
             </a:fld>
             <a:endParaRPr lang="en-IN"/>
           </a:p>
@@ -2216,7 +2216,7 @@
           <a:p>
             <a:fld id="{3A8F5538-2B5C-47D5-AABA-39B0C9F2042E}" type="datetimeFigureOut">
               <a:rPr lang="en-US" smtClean="0"/>
-              <a:t>5/30/2017</a:t>
+              <a:t>7/23/2017</a:t>
             </a:fld>
             <a:endParaRPr lang="en-IN"/>
           </a:p>
@@ -2499,7 +2499,7 @@
           <a:p>
             <a:fld id="{3A8F5538-2B5C-47D5-AABA-39B0C9F2042E}" type="datetimeFigureOut">
               <a:rPr lang="en-US" smtClean="0"/>
-              <a:t>5/30/2017</a:t>
+              <a:t>7/23/2017</a:t>
             </a:fld>
             <a:endParaRPr lang="en-IN"/>
           </a:p>
@@ -2916,7 +2916,7 @@
           <a:p>
             <a:fld id="{3A8F5538-2B5C-47D5-AABA-39B0C9F2042E}" type="datetimeFigureOut">
               <a:rPr lang="en-US" smtClean="0"/>
-              <a:t>5/30/2017</a:t>
+              <a:t>7/23/2017</a:t>
             </a:fld>
             <a:endParaRPr lang="en-IN"/>
           </a:p>
@@ -3029,7 +3029,7 @@
           <a:p>
             <a:fld id="{3A8F5538-2B5C-47D5-AABA-39B0C9F2042E}" type="datetimeFigureOut">
               <a:rPr lang="en-US" smtClean="0"/>
-              <a:t>5/30/2017</a:t>
+              <a:t>7/23/2017</a:t>
             </a:fld>
             <a:endParaRPr lang="en-IN"/>
           </a:p>
@@ -3119,7 +3119,7 @@
           <a:p>
             <a:fld id="{3A8F5538-2B5C-47D5-AABA-39B0C9F2042E}" type="datetimeFigureOut">
               <a:rPr lang="en-US" smtClean="0"/>
-              <a:t>5/30/2017</a:t>
+              <a:t>7/23/2017</a:t>
             </a:fld>
             <a:endParaRPr lang="en-IN"/>
           </a:p>
@@ -3391,7 +3391,7 @@
           <a:p>
             <a:fld id="{3A8F5538-2B5C-47D5-AABA-39B0C9F2042E}" type="datetimeFigureOut">
               <a:rPr lang="en-US" smtClean="0"/>
-              <a:t>5/30/2017</a:t>
+              <a:t>7/23/2017</a:t>
             </a:fld>
             <a:endParaRPr lang="en-IN"/>
           </a:p>
@@ -3639,7 +3639,7 @@
           <a:p>
             <a:fld id="{3A8F5538-2B5C-47D5-AABA-39B0C9F2042E}" type="datetimeFigureOut">
               <a:rPr lang="en-US" smtClean="0"/>
-              <a:t>5/30/2017</a:t>
+              <a:t>7/23/2017</a:t>
             </a:fld>
             <a:endParaRPr lang="en-IN"/>
           </a:p>
@@ -3847,7 +3847,7 @@
           <a:p>
             <a:fld id="{3A8F5538-2B5C-47D5-AABA-39B0C9F2042E}" type="datetimeFigureOut">
               <a:rPr lang="en-US" smtClean="0"/>
-              <a:t>5/30/2017</a:t>
+              <a:t>7/23/2017</a:t>
             </a:fld>
             <a:endParaRPr lang="en-IN"/>
           </a:p>
@@ -4337,7 +4337,7 @@
         </p:nvSpPr>
         <p:spPr>
           <a:xfrm>
-            <a:off x="0" y="117693"/>
+            <a:off x="0" y="0"/>
             <a:ext cx="9144000" cy="6740307"/>
           </a:xfrm>
           <a:prstGeom prst="rect">
@@ -4368,12 +4368,16 @@
               <a:t>Check </a:t>
             </a:r>
             <a:r>
-              <a:rPr lang="en-US"/>
+              <a:rPr lang="en-US" dirty="0"/>
               <a:t>if </a:t>
             </a:r>
             <a:r>
-              <a:rPr lang="en-US" smtClean="0"/>
-              <a:t>git </a:t>
+              <a:rPr lang="en-US" dirty="0" err="1" smtClean="0"/>
+              <a:t>git</a:t>
+            </a:r>
+            <a:r>
+              <a:rPr lang="en-US" dirty="0" smtClean="0"/>
+              <a:t> </a:t>
             </a:r>
             <a:r>
               <a:rPr lang="en-US" dirty="0"/>
@@ -4384,15 +4388,15 @@
             <a:pPr algn="ctr"/>
             <a:r>
               <a:rPr lang="en-US" dirty="0"/>
-              <a:t>terminal </a:t>
-            </a:r>
-            <a:r>
-              <a:rPr lang="en-US"/>
-              <a:t>- </a:t>
-            </a:r>
-            <a:r>
-              <a:rPr lang="en-US" smtClean="0"/>
-              <a:t>git </a:t>
+              <a:t>terminal - </a:t>
+            </a:r>
+            <a:r>
+              <a:rPr lang="en-US" dirty="0" err="1" smtClean="0"/>
+              <a:t>git</a:t>
+            </a:r>
+            <a:r>
+              <a:rPr lang="en-US" dirty="0" smtClean="0"/>
+              <a:t> </a:t>
             </a:r>
             <a:r>
               <a:rPr lang="en-US" dirty="0"/>
@@ -4422,24 +4426,43 @@
             </a:r>
             <a:r>
               <a:rPr lang="en-US" dirty="0"/>
-              <a:t>and </a:t>
-            </a:r>
-            <a:r>
-              <a:rPr lang="en-US"/>
-              <a:t>install </a:t>
-            </a:r>
-            <a:r>
-              <a:rPr lang="en-US" smtClean="0"/>
-              <a:t>git:https://git-scm.com/download</a:t>
+              <a:t>and install </a:t>
+            </a:r>
+            <a:r>
+              <a:rPr lang="en-US" dirty="0" err="1" smtClean="0"/>
+              <a:t>git:https</a:t>
+            </a:r>
+            <a:r>
+              <a:rPr lang="en-US" dirty="0" smtClean="0"/>
+              <a:t>://git-scm.com/download</a:t>
             </a:r>
             <a:r>
               <a:rPr lang="en-US" dirty="0" smtClean="0"/>
               <a:t>/</a:t>
             </a:r>
-            <a:endParaRPr lang="en-US" dirty="0"/>
           </a:p>
           <a:p>
             <a:pPr algn="ctr"/>
+            <a:r>
+              <a:rPr lang="en-US" dirty="0" smtClean="0"/>
+              <a:t>$ yum install </a:t>
+            </a:r>
+            <a:r>
+              <a:rPr lang="en-US" dirty="0" err="1" smtClean="0"/>
+              <a:t>git</a:t>
+            </a:r>
+            <a:r>
+              <a:rPr lang="en-US" dirty="0" smtClean="0"/>
+              <a:t> (for </a:t>
+            </a:r>
+            <a:r>
+              <a:rPr lang="en-US" dirty="0" err="1" smtClean="0"/>
+              <a:t>linux</a:t>
+            </a:r>
+            <a:r>
+              <a:rPr lang="en-US" dirty="0" smtClean="0"/>
+              <a:t> installation)</a:t>
+            </a:r>
             <a:r>
               <a:rPr lang="en-US" dirty="0"/>
               <a:t> </a:t>
@@ -4461,21 +4484,23 @@
             </a:r>
             <a:r>
               <a:rPr lang="en-US" dirty="0"/>
-              <a:t>and create a account </a:t>
-            </a:r>
-            <a:r>
-              <a:rPr lang="en-US"/>
-              <a:t>on </a:t>
-            </a:r>
-            <a:r>
-              <a:rPr lang="en-US" smtClean="0"/>
+              <a:t>and create a account on </a:t>
+            </a:r>
+            <a:r>
+              <a:rPr lang="en-US" dirty="0" err="1" smtClean="0"/>
               <a:t>GitHub:</a:t>
             </a:r>
             <a:r>
-              <a:rPr lang="en-US" smtClean="0">
+              <a:rPr lang="en-US" dirty="0" err="1" smtClean="0">
                 <a:hlinkClick r:id="rId3"/>
               </a:rPr>
-              <a:t>https://github.com</a:t>
+              <a:t>https</a:t>
+            </a:r>
+            <a:r>
+              <a:rPr lang="en-US" dirty="0" smtClean="0">
+                <a:hlinkClick r:id="rId3"/>
+              </a:rPr>
+              <a:t>://github.com</a:t>
             </a:r>
             <a:r>
               <a:rPr lang="en-US" dirty="0">
@@ -4509,31 +4534,35 @@
               <a:t>Add </a:t>
             </a:r>
             <a:r>
-              <a:rPr lang="en-US"/>
+              <a:rPr lang="en-US" dirty="0"/>
               <a:t>your </a:t>
             </a:r>
             <a:r>
-              <a:rPr lang="en-US" smtClean="0"/>
-              <a:t>github </a:t>
-            </a:r>
-            <a:r>
-              <a:rPr lang="en-US" dirty="0"/>
-              <a:t>email and username </a:t>
-            </a:r>
-            <a:r>
-              <a:rPr lang="en-US"/>
-              <a:t>to </a:t>
-            </a:r>
-            <a:r>
-              <a:rPr lang="en-US" smtClean="0"/>
+              <a:rPr lang="en-US" dirty="0" err="1" smtClean="0"/>
+              <a:t>github</a:t>
+            </a:r>
+            <a:r>
+              <a:rPr lang="en-US" dirty="0" smtClean="0"/>
+              <a:t> </a:t>
+            </a:r>
+            <a:r>
+              <a:rPr lang="en-US" dirty="0"/>
+              <a:t>email and username to </a:t>
+            </a:r>
+            <a:r>
+              <a:rPr lang="en-US" dirty="0" err="1" smtClean="0"/>
               <a:t>git</a:t>
             </a:r>
             <a:endParaRPr lang="en-US" dirty="0"/>
           </a:p>
           <a:p>
             <a:r>
-              <a:rPr lang="en-US" smtClean="0"/>
-              <a:t>git </a:t>
+              <a:rPr lang="en-US" dirty="0" err="1" smtClean="0"/>
+              <a:t>git</a:t>
+            </a:r>
+            <a:r>
+              <a:rPr lang="en-US" dirty="0" smtClean="0"/>
+              <a:t> </a:t>
             </a:r>
             <a:r>
               <a:rPr lang="en-US" dirty="0" err="1"/>
@@ -4549,25 +4578,25 @@
             </a:r>
             <a:r>
               <a:rPr lang="en-US" dirty="0"/>
+              <a:t> "</a:t>
+            </a:r>
+            <a:r>
+              <a:rPr lang="en-US" dirty="0" smtClean="0"/>
+              <a:t>yourGitHub@email.com</a:t>
+            </a:r>
+            <a:r>
+              <a:rPr lang="en-US" dirty="0"/>
+              <a:t>"</a:t>
+            </a:r>
+          </a:p>
+          <a:p>
+            <a:r>
+              <a:rPr lang="en-US" dirty="0" err="1" smtClean="0"/>
+              <a:t>git</a:t>
+            </a:r>
+            <a:r>
+              <a:rPr lang="en-US" dirty="0" smtClean="0"/>
               <a:t> </a:t>
-            </a:r>
-            <a:r>
-              <a:rPr lang="en-US"/>
-              <a:t>"</a:t>
-            </a:r>
-            <a:r>
-              <a:rPr lang="en-US" smtClean="0"/>
-              <a:t>yourGitHub@email.com</a:t>
-            </a:r>
-            <a:r>
-              <a:rPr lang="en-US" dirty="0"/>
-              <a:t>"</a:t>
-            </a:r>
-          </a:p>
-          <a:p>
-            <a:r>
-              <a:rPr lang="en-US" smtClean="0"/>
-              <a:t>git </a:t>
             </a:r>
             <a:r>
               <a:rPr lang="en-US" dirty="0" err="1"/>
@@ -4575,20 +4604,16 @@
             </a:r>
             <a:r>
               <a:rPr lang="en-US" dirty="0"/>
-              <a:t> --global user.name </a:t>
-            </a:r>
-            <a:r>
-              <a:rPr lang="en-US"/>
+              <a:t> --global user.name "</a:t>
+            </a:r>
+            <a:r>
+              <a:rPr lang="en-US" dirty="0" err="1" smtClean="0"/>
+              <a:t>yourGitHubusername</a:t>
+            </a:r>
+            <a:r>
+              <a:rPr lang="en-US" dirty="0"/>
               <a:t>"</a:t>
             </a:r>
-            <a:r>
-              <a:rPr lang="en-US" smtClean="0"/>
-              <a:t>yourGitHubusername</a:t>
-            </a:r>
-            <a:r>
-              <a:rPr lang="en-US" dirty="0"/>
-              <a:t>"</a:t>
-            </a:r>
           </a:p>
           <a:p>
             <a:pPr algn="ctr"/>
@@ -4601,15 +4626,15 @@
             <a:pPr algn="ctr"/>
             <a:r>
               <a:rPr lang="en-US" dirty="0"/>
-              <a:t>Step 5 : Add file/folders </a:t>
-            </a:r>
-            <a:r>
-              <a:rPr lang="en-US"/>
-              <a:t>to </a:t>
-            </a:r>
-            <a:r>
-              <a:rPr lang="en-US" smtClean="0"/>
-              <a:t>git </a:t>
+              <a:t>Step 5 : Add file/folders to </a:t>
+            </a:r>
+            <a:r>
+              <a:rPr lang="en-US" dirty="0" err="1" smtClean="0"/>
+              <a:t>git</a:t>
+            </a:r>
+            <a:r>
+              <a:rPr lang="en-US" dirty="0" smtClean="0"/>
+              <a:t> </a:t>
             </a:r>
             <a:r>
               <a:rPr lang="en-US" dirty="0"/>
@@ -4642,15 +4667,15 @@
             </a:r>
             <a:r>
               <a:rPr lang="en-US" dirty="0"/>
-              <a:t> the location of the folder/project </a:t>
-            </a:r>
-            <a:r>
-              <a:rPr lang="en-US"/>
-              <a:t>- </a:t>
-            </a:r>
-            <a:r>
-              <a:rPr lang="en-US" smtClean="0"/>
-              <a:t>git </a:t>
+              <a:t> the location of the folder/project - </a:t>
+            </a:r>
+            <a:r>
+              <a:rPr lang="en-US" dirty="0" err="1" smtClean="0"/>
+              <a:t>git</a:t>
+            </a:r>
+            <a:r>
+              <a:rPr lang="en-US" dirty="0" smtClean="0"/>
+              <a:t> </a:t>
             </a:r>
             <a:r>
               <a:rPr lang="en-US" dirty="0" err="1"/>
@@ -4660,12 +4685,16 @@
           </a:p>
           <a:p>
             <a:r>
-              <a:rPr lang="en-US"/>
+              <a:rPr lang="en-US" dirty="0"/>
               <a:t>- </a:t>
             </a:r>
             <a:r>
-              <a:rPr lang="en-US" smtClean="0"/>
-              <a:t>git </a:t>
+              <a:rPr lang="en-US" dirty="0" err="1" smtClean="0"/>
+              <a:t>git</a:t>
+            </a:r>
+            <a:r>
+              <a:rPr lang="en-US" dirty="0" smtClean="0"/>
+              <a:t> </a:t>
             </a:r>
             <a:r>
               <a:rPr lang="en-US" dirty="0"/>
@@ -4674,27 +4703,31 @@
           </a:p>
           <a:p>
             <a:r>
-              <a:rPr lang="en-US"/>
+              <a:rPr lang="en-US" dirty="0"/>
               <a:t>- </a:t>
             </a:r>
             <a:r>
-              <a:rPr lang="en-US" smtClean="0"/>
-              <a:t>git </a:t>
+              <a:rPr lang="en-US" dirty="0" err="1" smtClean="0"/>
+              <a:t>git</a:t>
             </a:r>
             <a:r>
               <a:rPr lang="en-US" dirty="0" smtClean="0"/>
-              <a:t>adds .</a:t>
+              <a:t> adds .</a:t>
             </a:r>
             <a:endParaRPr lang="en-US" dirty="0"/>
           </a:p>
           <a:p>
             <a:r>
-              <a:rPr lang="en-US"/>
+              <a:rPr lang="en-US" dirty="0"/>
               <a:t>- </a:t>
             </a:r>
             <a:r>
-              <a:rPr lang="en-US" smtClean="0"/>
-              <a:t>git </a:t>
+              <a:rPr lang="en-US" dirty="0" err="1" smtClean="0"/>
+              <a:t>git</a:t>
+            </a:r>
+            <a:r>
+              <a:rPr lang="en-US" dirty="0" smtClean="0"/>
+              <a:t> </a:t>
             </a:r>
             <a:r>
               <a:rPr lang="en-US" dirty="0"/>
@@ -4703,12 +4736,16 @@
           </a:p>
           <a:p>
             <a:r>
-              <a:rPr lang="en-US"/>
+              <a:rPr lang="en-US" dirty="0"/>
               <a:t>- </a:t>
             </a:r>
             <a:r>
-              <a:rPr lang="en-US" smtClean="0"/>
-              <a:t>git </a:t>
+              <a:rPr lang="en-US" dirty="0" err="1" smtClean="0"/>
+              <a:t>git</a:t>
+            </a:r>
+            <a:r>
+              <a:rPr lang="en-US" dirty="0" smtClean="0"/>
+              <a:t> </a:t>
             </a:r>
             <a:r>
               <a:rPr lang="en-US" dirty="0"/>
@@ -4717,12 +4754,16 @@
           </a:p>
           <a:p>
             <a:r>
-              <a:rPr lang="en-US"/>
+              <a:rPr lang="en-US" dirty="0"/>
               <a:t>- </a:t>
             </a:r>
             <a:r>
-              <a:rPr lang="en-US" smtClean="0"/>
-              <a:t>git </a:t>
+              <a:rPr lang="en-US" dirty="0" err="1" smtClean="0"/>
+              <a:t>git</a:t>
+            </a:r>
+            <a:r>
+              <a:rPr lang="en-US" dirty="0" smtClean="0"/>
+              <a:t> </a:t>
             </a:r>
             <a:r>
               <a:rPr lang="en-US" dirty="0"/>
@@ -4731,20 +4772,24 @@
           </a:p>
           <a:p>
             <a:r>
-              <a:rPr lang="en-US"/>
+              <a:rPr lang="en-US" dirty="0"/>
               <a:t>- </a:t>
             </a:r>
             <a:r>
-              <a:rPr lang="en-US" smtClean="0"/>
-              <a:t>git </a:t>
+              <a:rPr lang="en-US" dirty="0" err="1" smtClean="0"/>
+              <a:t>git</a:t>
             </a:r>
             <a:r>
               <a:rPr lang="en-US" dirty="0" smtClean="0"/>
-              <a:t>log and </a:t>
-            </a:r>
-            <a:r>
-              <a:rPr lang="en-US" smtClean="0"/>
-              <a:t>- git </a:t>
+              <a:t> log and - </a:t>
+            </a:r>
+            <a:r>
+              <a:rPr lang="en-US" dirty="0" err="1" smtClean="0"/>
+              <a:t>git</a:t>
+            </a:r>
+            <a:r>
+              <a:rPr lang="en-US" dirty="0" smtClean="0"/>
+              <a:t> </a:t>
             </a:r>
             <a:r>
               <a:rPr lang="en-US" dirty="0"/>
@@ -7114,7 +7159,7 @@
         </p:blipFill>
         <p:spPr bwMode="auto">
           <a:xfrm>
-            <a:off x="0" y="-95250"/>
+            <a:off x="0" y="-152400"/>
             <a:ext cx="9144000" cy="6953250"/>
           </a:xfrm>
           <a:prstGeom prst="rect">
@@ -7802,12 +7847,8 @@
           <a:p>
             <a:pPr algn="ctr"/>
             <a:r>
-              <a:rPr lang="en-US" sz="2800" smtClean="0"/>
-              <a:t>GIT </a:t>
-            </a:r>
-            <a:r>
               <a:rPr lang="en-US" sz="2800" dirty="0" smtClean="0"/>
-              <a:t>HUB</a:t>
+              <a:t>GIT HUB</a:t>
             </a:r>
           </a:p>
           <a:p>
@@ -7816,36 +7857,26 @@
               <a:t>What </a:t>
             </a:r>
             <a:r>
-              <a:rPr lang="en-IN"/>
+              <a:rPr lang="en-IN" dirty="0"/>
               <a:t>is </a:t>
             </a:r>
             <a:r>
-              <a:rPr lang="en-IN" smtClean="0"/>
-              <a:t>GIT </a:t>
-            </a:r>
-            <a:r>
               <a:rPr lang="en-IN" dirty="0" smtClean="0"/>
-              <a:t>HUB</a:t>
-            </a:r>
-          </a:p>
-          <a:p>
-            <a:r>
-              <a:rPr lang="en-IN">
+              <a:t>GIT HUB</a:t>
+            </a:r>
+          </a:p>
+          <a:p>
+            <a:r>
+              <a:rPr lang="en-IN" dirty="0">
                 <a:hlinkClick r:id="rId3"/>
               </a:rPr>
               <a:t>https</a:t>
             </a:r>
             <a:r>
-              <a:rPr lang="en-IN" smtClean="0">
-                <a:hlinkClick r:id="rId3"/>
-              </a:rPr>
-              <a:t>://github.com</a:t>
-            </a:r>
-            <a:r>
               <a:rPr lang="en-IN" dirty="0" smtClean="0">
                 <a:hlinkClick r:id="rId3"/>
               </a:rPr>
-              <a:t>/</a:t>
+              <a:t>://github.com/</a:t>
             </a:r>
             <a:r>
               <a:rPr lang="en-IN" dirty="0" smtClean="0"/>
@@ -7854,7 +7885,7 @@
           </a:p>
           <a:p>
             <a:r>
-              <a:rPr lang="en-US" smtClean="0"/>
+              <a:rPr lang="en-US" dirty="0" smtClean="0"/>
               <a:t>GitHub </a:t>
             </a:r>
             <a:r>
@@ -7927,24 +7958,16 @@
           </a:p>
           <a:p>
             <a:r>
-              <a:rPr lang="en-IN" smtClean="0"/>
+              <a:rPr lang="en-IN" dirty="0" smtClean="0"/>
               <a:t>Is GIT </a:t>
             </a:r>
             <a:r>
               <a:rPr lang="en-IN" dirty="0"/>
-              <a:t>related </a:t>
-            </a:r>
-            <a:r>
-              <a:rPr lang="en-IN"/>
-              <a:t>to </a:t>
-            </a:r>
-            <a:r>
-              <a:rPr lang="en-IN" smtClean="0"/>
-              <a:t>GIT </a:t>
+              <a:t>related to </a:t>
             </a:r>
             <a:r>
               <a:rPr lang="en-IN" dirty="0" smtClean="0"/>
-              <a:t>HUB</a:t>
+              <a:t>GIT HUB</a:t>
             </a:r>
           </a:p>
           <a:p>
@@ -7955,20 +7978,8 @@
           </a:p>
           <a:p>
             <a:r>
-              <a:rPr lang="en-IN" smtClean="0"/>
-              <a:t>GIT </a:t>
-            </a:r>
-            <a:r>
               <a:rPr lang="en-IN" dirty="0" smtClean="0"/>
-              <a:t>is a Version Control System (VCS) </a:t>
-            </a:r>
-            <a:r>
-              <a:rPr lang="en-IN" smtClean="0"/>
-              <a:t>and GITHUB </a:t>
-            </a:r>
-            <a:r>
-              <a:rPr lang="en-IN" dirty="0" smtClean="0"/>
-              <a:t>is a website based remote location to upload your repositories.</a:t>
+              <a:t>GIT is a Version Control System (VCS) and GITHUB is a website based remote location to upload your repositories.</a:t>
             </a:r>
             <a:endParaRPr lang="en-IN" dirty="0"/>
           </a:p>
@@ -8176,13 +8187,8 @@
             </a:pPr>
             <a:r>
               <a:rPr lang="en-US" dirty="0" smtClean="0"/>
-              <a:t>Download and </a:t>
-            </a:r>
-            <a:r>
-              <a:rPr lang="en-US" smtClean="0"/>
-              <a:t>Install GIT.</a:t>
-            </a:r>
-            <a:endParaRPr lang="en-US" dirty="0" smtClean="0"/>
+              <a:t>Download and Install GIT.</a:t>
+            </a:r>
           </a:p>
           <a:p>
             <a:pPr marL="342900" indent="-342900">
@@ -8190,15 +8196,7 @@
             </a:pPr>
             <a:r>
               <a:rPr lang="en-US" dirty="0" smtClean="0"/>
-              <a:t>Signup and Create a account </a:t>
-            </a:r>
-            <a:r>
-              <a:rPr lang="en-US" smtClean="0"/>
-              <a:t>on GITHUB</a:t>
-            </a:r>
-            <a:r>
-              <a:rPr lang="en-US" dirty="0" smtClean="0"/>
-              <a:t>.</a:t>
+              <a:t>Signup and Create a account on GITHUB.</a:t>
             </a:r>
           </a:p>
           <a:p>
@@ -8207,13 +8205,8 @@
             </a:pPr>
             <a:r>
               <a:rPr lang="en-US" dirty="0" smtClean="0"/>
-              <a:t>Add a file/folder </a:t>
-            </a:r>
-            <a:r>
-              <a:rPr lang="en-US" smtClean="0"/>
-              <a:t>to GIT.</a:t>
-            </a:r>
-            <a:endParaRPr lang="en-US" dirty="0" smtClean="0"/>
+              <a:t>Add a file/folder to GIT.</a:t>
+            </a:r>
           </a:p>
           <a:p>
             <a:pPr marL="342900" indent="-342900">
@@ -8230,15 +8223,7 @@
             </a:pPr>
             <a:r>
               <a:rPr lang="en-US" dirty="0" smtClean="0"/>
-              <a:t>Add the repository </a:t>
-            </a:r>
-            <a:r>
-              <a:rPr lang="en-US" smtClean="0"/>
-              <a:t>on GITHUB</a:t>
-            </a:r>
-            <a:r>
-              <a:rPr lang="en-US" dirty="0" smtClean="0"/>
-              <a:t>.</a:t>
+              <a:t>Add the repository on GITHUB.</a:t>
             </a:r>
             <a:endParaRPr lang="en-US" dirty="0"/>
           </a:p>

</xml_diff>